<commit_message>
Update Installation Steps to add EC2 Full Access to Service Role
</commit_message>
<xml_diff>
--- a/slides/AWS-EKS-Cluster-Quickstart.pptx
+++ b/slides/AWS-EKS-Cluster-Quickstart.pptx
@@ -206,7 +206,7 @@
             <a:fld id="{814910AB-AEF0-414C-82CB-791080B1186B}" type="datetimeFigureOut">
               <a:rPr lang="en-US" smtClean="0"/>
               <a:pPr/>
-              <a:t>8/13/2018</a:t>
+              <a:t>9/18/2018</a:t>
             </a:fld>
             <a:endParaRPr lang="en-US" dirty="0"/>
           </a:p>
@@ -373,7 +373,7 @@
             <a:fld id="{5B4AE38D-E020-46F3-803D-8636C5B7B74E}" type="datetimeFigureOut">
               <a:rPr lang="en-US" smtClean="0"/>
               <a:pPr/>
-              <a:t>8/13/2018</a:t>
+              <a:t>9/18/2018</a:t>
             </a:fld>
             <a:endParaRPr lang="en-US" dirty="0"/>
           </a:p>
@@ -1201,7 +1201,7 @@
             <a:fld id="{7DDB771E-4AED-4DD3-8AA1-5D9FD2224F14}" type="datetimeFigureOut">
               <a:rPr lang="en-US" smtClean="0"/>
               <a:pPr/>
-              <a:t>8/13/2018</a:t>
+              <a:t>9/18/2018</a:t>
             </a:fld>
             <a:endParaRPr lang="en-US" dirty="0"/>
           </a:p>
@@ -1368,7 +1368,7 @@
             <a:fld id="{7DDB771E-4AED-4DD3-8AA1-5D9FD2224F14}" type="datetimeFigureOut">
               <a:rPr lang="en-US" smtClean="0"/>
               <a:pPr/>
-              <a:t>8/13/2018</a:t>
+              <a:t>9/18/2018</a:t>
             </a:fld>
             <a:endParaRPr lang="en-US" dirty="0"/>
           </a:p>
@@ -1545,7 +1545,7 @@
             <a:fld id="{7DDB771E-4AED-4DD3-8AA1-5D9FD2224F14}" type="datetimeFigureOut">
               <a:rPr lang="en-US" smtClean="0"/>
               <a:pPr/>
-              <a:t>8/13/2018</a:t>
+              <a:t>9/18/2018</a:t>
             </a:fld>
             <a:endParaRPr lang="en-US" dirty="0"/>
           </a:p>
@@ -1712,7 +1712,7 @@
             <a:fld id="{7DDB771E-4AED-4DD3-8AA1-5D9FD2224F14}" type="datetimeFigureOut">
               <a:rPr lang="en-US" smtClean="0"/>
               <a:pPr/>
-              <a:t>8/13/2018</a:t>
+              <a:t>9/18/2018</a:t>
             </a:fld>
             <a:endParaRPr lang="en-US" dirty="0"/>
           </a:p>
@@ -1955,7 +1955,7 @@
             <a:fld id="{7DDB771E-4AED-4DD3-8AA1-5D9FD2224F14}" type="datetimeFigureOut">
               <a:rPr lang="en-US" smtClean="0"/>
               <a:pPr/>
-              <a:t>8/13/2018</a:t>
+              <a:t>9/18/2018</a:t>
             </a:fld>
             <a:endParaRPr lang="en-US" dirty="0"/>
           </a:p>
@@ -2240,7 +2240,7 @@
             <a:fld id="{7DDB771E-4AED-4DD3-8AA1-5D9FD2224F14}" type="datetimeFigureOut">
               <a:rPr lang="en-US" smtClean="0"/>
               <a:pPr/>
-              <a:t>8/13/2018</a:t>
+              <a:t>9/18/2018</a:t>
             </a:fld>
             <a:endParaRPr lang="en-US" dirty="0"/>
           </a:p>
@@ -2659,7 +2659,7 @@
             <a:fld id="{7DDB771E-4AED-4DD3-8AA1-5D9FD2224F14}" type="datetimeFigureOut">
               <a:rPr lang="en-US" smtClean="0"/>
               <a:pPr/>
-              <a:t>8/13/2018</a:t>
+              <a:t>9/18/2018</a:t>
             </a:fld>
             <a:endParaRPr lang="en-US" dirty="0"/>
           </a:p>
@@ -2774,7 +2774,7 @@
             <a:fld id="{7DDB771E-4AED-4DD3-8AA1-5D9FD2224F14}" type="datetimeFigureOut">
               <a:rPr lang="en-US" smtClean="0"/>
               <a:pPr/>
-              <a:t>8/13/2018</a:t>
+              <a:t>9/18/2018</a:t>
             </a:fld>
             <a:endParaRPr lang="en-US" dirty="0"/>
           </a:p>
@@ -2866,7 +2866,7 @@
             <a:fld id="{7DDB771E-4AED-4DD3-8AA1-5D9FD2224F14}" type="datetimeFigureOut">
               <a:rPr lang="en-US" smtClean="0"/>
               <a:pPr/>
-              <a:t>8/13/2018</a:t>
+              <a:t>9/18/2018</a:t>
             </a:fld>
             <a:endParaRPr lang="en-US" dirty="0"/>
           </a:p>
@@ -3140,7 +3140,7 @@
             <a:fld id="{7DDB771E-4AED-4DD3-8AA1-5D9FD2224F14}" type="datetimeFigureOut">
               <a:rPr lang="en-US" smtClean="0"/>
               <a:pPr/>
-              <a:t>8/13/2018</a:t>
+              <a:t>9/18/2018</a:t>
             </a:fld>
             <a:endParaRPr lang="en-US" dirty="0"/>
           </a:p>
@@ -3390,7 +3390,7 @@
             <a:fld id="{7DDB771E-4AED-4DD3-8AA1-5D9FD2224F14}" type="datetimeFigureOut">
               <a:rPr lang="en-US" smtClean="0"/>
               <a:pPr/>
-              <a:t>8/13/2018</a:t>
+              <a:t>9/18/2018</a:t>
             </a:fld>
             <a:endParaRPr lang="en-US" dirty="0"/>
           </a:p>
@@ -3600,7 +3600,7 @@
             <a:fld id="{7DDB771E-4AED-4DD3-8AA1-5D9FD2224F14}" type="datetimeFigureOut">
               <a:rPr lang="en-US" smtClean="0"/>
               <a:pPr/>
-              <a:t>8/13/2018</a:t>
+              <a:t>9/18/2018</a:t>
             </a:fld>
             <a:endParaRPr lang="en-US" dirty="0"/>
           </a:p>
@@ -4404,7 +4404,7 @@
               <a:buChar char="•"/>
             </a:pPr>
             <a:r>
-              <a:rPr lang="en-US" smtClean="0"/>
+              <a:rPr lang="en-US" dirty="0" smtClean="0"/>
               <a:t> 63% </a:t>
             </a:r>
             <a:r>
@@ -4800,8 +4800,13 @@
             </a:pPr>
             <a:r>
               <a:rPr lang="en-US" dirty="0" smtClean="0"/>
-              <a:t>  AWS Account</a:t>
-            </a:r>
+              <a:t>  AWS </a:t>
+            </a:r>
+            <a:r>
+              <a:rPr lang="en-US" dirty="0" smtClean="0"/>
+              <a:t>Account (root)</a:t>
+            </a:r>
+            <a:endParaRPr lang="en-US" dirty="0" smtClean="0"/>
           </a:p>
           <a:p>
             <a:pPr>
@@ -4810,7 +4815,15 @@
             </a:pPr>
             <a:r>
               <a:rPr lang="en-US" dirty="0" smtClean="0"/>
-              <a:t>  An EC2 Instance in which to install kubectl, heptio-authenticator-aws, and awscli version 1.15.x or greater</a:t>
+              <a:t>  An EC2 Instance in which to install kubectl, </a:t>
+            </a:r>
+            <a:r>
+              <a:rPr lang="en-US" dirty="0"/>
+              <a:t>aws-iam-authenticator, </a:t>
+            </a:r>
+            <a:r>
+              <a:rPr lang="en-US" dirty="0" smtClean="0"/>
+              <a:t>and awscli version 1.15.x or greater</a:t>
             </a:r>
           </a:p>
           <a:p>
@@ -5268,8 +5281,8 @@
         </p:nvSpPr>
         <p:spPr>
           <a:xfrm>
-            <a:off x="757367" y="1584186"/>
-            <a:ext cx="7515090" cy="2308324"/>
+            <a:off x="501706" y="1584186"/>
+            <a:ext cx="7986839" cy="2585323"/>
           </a:xfrm>
           <a:prstGeom prst="rect">
             <a:avLst/>
@@ -5296,7 +5309,7 @@
             </a:r>
             <a:r>
               <a:rPr lang="en-US" dirty="0" smtClean="0"/>
-              <a:t>Role</a:t>
+              <a:t>Role (AWS IAM Console)</a:t>
             </a:r>
           </a:p>
           <a:p>
@@ -5306,16 +5319,17 @@
             </a:pPr>
             <a:r>
               <a:rPr lang="en-US" dirty="0" smtClean="0"/>
-              <a:t>  Create </a:t>
+              <a:t>  Add </a:t>
             </a:r>
             <a:r>
               <a:rPr lang="en-US" dirty="0"/>
-              <a:t>your Amazon EKS Cluster </a:t>
-            </a:r>
-            <a:r>
-              <a:rPr lang="en-US" dirty="0" smtClean="0"/>
-              <a:t>VPC</a:t>
-            </a:r>
+              <a:t>Amazon EC2 Full Access to Service </a:t>
+            </a:r>
+            <a:r>
+              <a:rPr lang="en-US" dirty="0" smtClean="0"/>
+              <a:t>Role (AWS IAM Console)</a:t>
+            </a:r>
+            <a:endParaRPr lang="en-US" dirty="0" smtClean="0"/>
           </a:p>
           <a:p>
             <a:pPr>
@@ -5323,21 +5337,18 @@
               <a:buChar char="•"/>
             </a:pPr>
             <a:r>
+              <a:rPr lang="en-US" dirty="0" smtClean="0"/>
+              <a:t>  Create </a:t>
+            </a:r>
+            <a:r>
               <a:rPr lang="en-US" dirty="0"/>
-              <a:t> </a:t>
-            </a:r>
-            <a:r>
-              <a:rPr lang="en-US" dirty="0" smtClean="0"/>
-              <a:t> Create </a:t>
-            </a:r>
-            <a:r>
-              <a:rPr lang="en-US" dirty="0"/>
-              <a:t>your Amazon EKS </a:t>
-            </a:r>
-            <a:r>
-              <a:rPr lang="en-US" dirty="0" smtClean="0"/>
-              <a:t>Cluster</a:t>
-            </a:r>
+              <a:t>your Amazon EKS Cluster </a:t>
+            </a:r>
+            <a:r>
+              <a:rPr lang="en-US" dirty="0" smtClean="0"/>
+              <a:t>VPC (CloudFormation)</a:t>
+            </a:r>
+            <a:endParaRPr lang="en-US" dirty="0" smtClean="0"/>
           </a:p>
           <a:p>
             <a:pPr>
@@ -5345,16 +5356,20 @@
               <a:buChar char="•"/>
             </a:pPr>
             <a:r>
-              <a:rPr lang="en-US" dirty="0" smtClean="0"/>
-              <a:t>  Launch </a:t>
-            </a:r>
-            <a:r>
               <a:rPr lang="en-US" dirty="0"/>
-              <a:t>and Configure Your Amazon EKS Worker </a:t>
-            </a:r>
-            <a:r>
-              <a:rPr lang="en-US" dirty="0" smtClean="0"/>
-              <a:t>Nodes</a:t>
+              <a:t> </a:t>
+            </a:r>
+            <a:r>
+              <a:rPr lang="en-US" dirty="0" smtClean="0"/>
+              <a:t> Create </a:t>
+            </a:r>
+            <a:r>
+              <a:rPr lang="en-US" dirty="0"/>
+              <a:t>your Amazon EKS </a:t>
+            </a:r>
+            <a:r>
+              <a:rPr lang="en-US" dirty="0" smtClean="0"/>
+              <a:t>Cluster (AWS EKS Console)</a:t>
             </a:r>
             <a:endParaRPr lang="en-US" dirty="0" smtClean="0"/>
           </a:p>
@@ -5365,8 +5380,17 @@
             </a:pPr>
             <a:r>
               <a:rPr lang="en-US" dirty="0" smtClean="0"/>
-              <a:t>  Configure Your AWS EC2 Instance</a:t>
-            </a:r>
+              <a:t>  Launch </a:t>
+            </a:r>
+            <a:r>
+              <a:rPr lang="en-US" dirty="0"/>
+              <a:t>and Configure Your Amazon EKS Worker </a:t>
+            </a:r>
+            <a:r>
+              <a:rPr lang="en-US" dirty="0" smtClean="0"/>
+              <a:t>Nodes (AWS CloudFormation)</a:t>
+            </a:r>
+            <a:endParaRPr lang="en-US" dirty="0" smtClean="0"/>
           </a:p>
           <a:p>
             <a:pPr>
@@ -5375,8 +5399,13 @@
             </a:pPr>
             <a:r>
               <a:rPr lang="en-US" dirty="0" smtClean="0"/>
-              <a:t>  Configure kubectl on Your EC2 Instance</a:t>
-            </a:r>
+              <a:t>  Configure Your AWS EC2 </a:t>
+            </a:r>
+            <a:r>
+              <a:rPr lang="en-US" dirty="0" smtClean="0"/>
+              <a:t>Instance (AWS EC2 Console)</a:t>
+            </a:r>
+            <a:endParaRPr lang="en-US" dirty="0" smtClean="0"/>
           </a:p>
           <a:p>
             <a:pPr>
@@ -5385,16 +5414,13 @@
             </a:pPr>
             <a:r>
               <a:rPr lang="en-US" dirty="0" smtClean="0"/>
-              <a:t>  Enable </a:t>
-            </a:r>
-            <a:r>
-              <a:rPr lang="en-US" dirty="0"/>
-              <a:t>Worker Nodes to Join Your </a:t>
-            </a:r>
-            <a:r>
-              <a:rPr lang="en-US" dirty="0" smtClean="0"/>
-              <a:t>Cluster</a:t>
-            </a:r>
+              <a:t>  Configure kubectl on Your EC2 </a:t>
+            </a:r>
+            <a:r>
+              <a:rPr lang="en-US" dirty="0" smtClean="0"/>
+              <a:t>Instance (AWS EC2 Instance cloud-init)</a:t>
+            </a:r>
+            <a:endParaRPr lang="en-US" dirty="0" smtClean="0"/>
           </a:p>
           <a:p>
             <a:pPr>
@@ -5402,6 +5428,25 @@
               <a:buChar char="•"/>
             </a:pPr>
             <a:r>
+              <a:rPr lang="en-US" dirty="0" smtClean="0"/>
+              <a:t>  Enable </a:t>
+            </a:r>
+            <a:r>
+              <a:rPr lang="en-US" dirty="0"/>
+              <a:t>Worker Nodes to Join Your </a:t>
+            </a:r>
+            <a:r>
+              <a:rPr lang="en-US" dirty="0" smtClean="0"/>
+              <a:t>Cluster (AWS EC2 Instance kubectl)</a:t>
+            </a:r>
+            <a:endParaRPr lang="en-US" dirty="0" smtClean="0"/>
+          </a:p>
+          <a:p>
+            <a:pPr>
+              <a:buFont typeface="Arial" pitchFamily="34" charset="0"/>
+              <a:buChar char="•"/>
+            </a:pPr>
+            <a:r>
               <a:rPr lang="en-US" dirty="0"/>
               <a:t> </a:t>
             </a:r>
@@ -5411,7 +5456,11 @@
             </a:r>
             <a:r>
               <a:rPr lang="en-US" dirty="0"/>
-              <a:t>to Your Cluster</a:t>
+              <a:t>to Your </a:t>
+            </a:r>
+            <a:r>
+              <a:rPr lang="en-US" dirty="0" smtClean="0"/>
+              <a:t>Cluster (AWS EC2 Instance kubectl)</a:t>
             </a:r>
             <a:endParaRPr lang="en-US" dirty="0" smtClean="0"/>
           </a:p>
@@ -5500,15 +5549,7 @@
             </a:pPr>
             <a:r>
               <a:rPr lang="en-US" dirty="0" smtClean="0"/>
-              <a:t>  To save time AWS EKS Cluster has already been configured using the AWS Web Console, CloudFormation, </a:t>
-            </a:r>
-            <a:r>
-              <a:rPr lang="en-US" dirty="0" smtClean="0"/>
-              <a:t>cloud-init </a:t>
-            </a:r>
-            <a:r>
-              <a:rPr lang="en-US" dirty="0" smtClean="0"/>
-              <a:t>script, and some manual configuration.</a:t>
+              <a:t>  To save time AWS EKS Cluster has already been configured using the AWS Web Console, CloudFormation, cloud-init script, and some manual configuration.</a:t>
             </a:r>
           </a:p>
           <a:p>
@@ -5528,15 +5569,7 @@
             </a:pPr>
             <a:r>
               <a:rPr lang="en-US" dirty="0" smtClean="0"/>
-              <a:t>  Deploy an application using a docker image located in DockerHub at kskalvar/web. This image is nothing more than a simple </a:t>
-            </a:r>
-            <a:r>
-              <a:rPr lang="en-US" dirty="0" smtClean="0"/>
-              <a:t>flask webapp </a:t>
-            </a:r>
-            <a:r>
-              <a:rPr lang="en-US" dirty="0" smtClean="0"/>
-              <a:t>that returns the current ip address of the container it's running in. We'll create a pod, scale the pod, and create an external AWS Load Balancer using kubectl.</a:t>
+              <a:t>  Deploy an application using a docker image located in DockerHub at kskalvar/web. This image is nothing more than a simple flask webapp that returns the current ip address of the container it's running in. We'll create a pod, scale the pod, and create an external AWS Load Balancer using kubectl.</a:t>
             </a:r>
           </a:p>
           <a:p>

</xml_diff>

<commit_message>
Update slides with EKS Fargate delivery date
</commit_message>
<xml_diff>
--- a/slides/AWS-EKS-Cluster-Quickstart.pptx
+++ b/slides/AWS-EKS-Cluster-Quickstart.pptx
@@ -5640,7 +5640,7 @@
         <p:spPr>
           <a:xfrm>
             <a:off x="757367" y="1584186"/>
-            <a:ext cx="7515090" cy="2031325"/>
+            <a:ext cx="7515090" cy="2308324"/>
           </a:xfrm>
           <a:prstGeom prst="rect">
             <a:avLst/>
@@ -5695,8 +5695,35 @@
             </a:r>
             <a:r>
               <a:rPr lang="en-US" dirty="0" smtClean="0"/>
-              <a:t> AWS EKS Fargate still a ways off</a:t>
-            </a:r>
+              <a:t> AWS EKS Fargate still a ways </a:t>
+            </a:r>
+            <a:r>
+              <a:rPr lang="en-US" dirty="0" smtClean="0"/>
+              <a:t>off</a:t>
+            </a:r>
+          </a:p>
+          <a:p>
+            <a:pPr lvl="1">
+              <a:buFont typeface="Arial" pitchFamily="34" charset="0"/>
+              <a:buChar char="•"/>
+            </a:pPr>
+            <a:r>
+              <a:rPr lang="en-US" dirty="0"/>
+              <a:t> </a:t>
+            </a:r>
+            <a:r>
+              <a:rPr lang="en-US" dirty="0" smtClean="0"/>
+              <a:t> </a:t>
+            </a:r>
+            <a:r>
+              <a:rPr lang="en-US" dirty="0"/>
+              <a:t>AWS Fargate support for Amazon EKS will be available in </a:t>
+            </a:r>
+            <a:r>
+              <a:rPr lang="en-US" dirty="0" smtClean="0"/>
+              <a:t>2018</a:t>
+            </a:r>
+            <a:endParaRPr lang="en-US" dirty="0" smtClean="0"/>
           </a:p>
           <a:p>
             <a:pPr>

</xml_diff>

<commit_message>
Update slides from AWS Washington DC Meetup
</commit_message>
<xml_diff>
--- a/slides/AWS-EKS-Cluster-Quickstart.pptx
+++ b/slides/AWS-EKS-Cluster-Quickstart.pptx
@@ -206,7 +206,7 @@
             <a:fld id="{814910AB-AEF0-414C-82CB-791080B1186B}" type="datetimeFigureOut">
               <a:rPr lang="en-US" smtClean="0"/>
               <a:pPr/>
-              <a:t>9/18/2018</a:t>
+              <a:t>9/26/2018</a:t>
             </a:fld>
             <a:endParaRPr lang="en-US" dirty="0"/>
           </a:p>
@@ -373,7 +373,7 @@
             <a:fld id="{5B4AE38D-E020-46F3-803D-8636C5B7B74E}" type="datetimeFigureOut">
               <a:rPr lang="en-US" smtClean="0"/>
               <a:pPr/>
-              <a:t>9/18/2018</a:t>
+              <a:t>9/26/2018</a:t>
             </a:fld>
             <a:endParaRPr lang="en-US" dirty="0"/>
           </a:p>
@@ -1201,7 +1201,7 @@
             <a:fld id="{7DDB771E-4AED-4DD3-8AA1-5D9FD2224F14}" type="datetimeFigureOut">
               <a:rPr lang="en-US" smtClean="0"/>
               <a:pPr/>
-              <a:t>9/18/2018</a:t>
+              <a:t>9/26/2018</a:t>
             </a:fld>
             <a:endParaRPr lang="en-US" dirty="0"/>
           </a:p>
@@ -1368,7 +1368,7 @@
             <a:fld id="{7DDB771E-4AED-4DD3-8AA1-5D9FD2224F14}" type="datetimeFigureOut">
               <a:rPr lang="en-US" smtClean="0"/>
               <a:pPr/>
-              <a:t>9/18/2018</a:t>
+              <a:t>9/26/2018</a:t>
             </a:fld>
             <a:endParaRPr lang="en-US" dirty="0"/>
           </a:p>
@@ -1545,7 +1545,7 @@
             <a:fld id="{7DDB771E-4AED-4DD3-8AA1-5D9FD2224F14}" type="datetimeFigureOut">
               <a:rPr lang="en-US" smtClean="0"/>
               <a:pPr/>
-              <a:t>9/18/2018</a:t>
+              <a:t>9/26/2018</a:t>
             </a:fld>
             <a:endParaRPr lang="en-US" dirty="0"/>
           </a:p>
@@ -1712,7 +1712,7 @@
             <a:fld id="{7DDB771E-4AED-4DD3-8AA1-5D9FD2224F14}" type="datetimeFigureOut">
               <a:rPr lang="en-US" smtClean="0"/>
               <a:pPr/>
-              <a:t>9/18/2018</a:t>
+              <a:t>9/26/2018</a:t>
             </a:fld>
             <a:endParaRPr lang="en-US" dirty="0"/>
           </a:p>
@@ -1955,7 +1955,7 @@
             <a:fld id="{7DDB771E-4AED-4DD3-8AA1-5D9FD2224F14}" type="datetimeFigureOut">
               <a:rPr lang="en-US" smtClean="0"/>
               <a:pPr/>
-              <a:t>9/18/2018</a:t>
+              <a:t>9/26/2018</a:t>
             </a:fld>
             <a:endParaRPr lang="en-US" dirty="0"/>
           </a:p>
@@ -2240,7 +2240,7 @@
             <a:fld id="{7DDB771E-4AED-4DD3-8AA1-5D9FD2224F14}" type="datetimeFigureOut">
               <a:rPr lang="en-US" smtClean="0"/>
               <a:pPr/>
-              <a:t>9/18/2018</a:t>
+              <a:t>9/26/2018</a:t>
             </a:fld>
             <a:endParaRPr lang="en-US" dirty="0"/>
           </a:p>
@@ -2659,7 +2659,7 @@
             <a:fld id="{7DDB771E-4AED-4DD3-8AA1-5D9FD2224F14}" type="datetimeFigureOut">
               <a:rPr lang="en-US" smtClean="0"/>
               <a:pPr/>
-              <a:t>9/18/2018</a:t>
+              <a:t>9/26/2018</a:t>
             </a:fld>
             <a:endParaRPr lang="en-US" dirty="0"/>
           </a:p>
@@ -2774,7 +2774,7 @@
             <a:fld id="{7DDB771E-4AED-4DD3-8AA1-5D9FD2224F14}" type="datetimeFigureOut">
               <a:rPr lang="en-US" smtClean="0"/>
               <a:pPr/>
-              <a:t>9/18/2018</a:t>
+              <a:t>9/26/2018</a:t>
             </a:fld>
             <a:endParaRPr lang="en-US" dirty="0"/>
           </a:p>
@@ -2866,7 +2866,7 @@
             <a:fld id="{7DDB771E-4AED-4DD3-8AA1-5D9FD2224F14}" type="datetimeFigureOut">
               <a:rPr lang="en-US" smtClean="0"/>
               <a:pPr/>
-              <a:t>9/18/2018</a:t>
+              <a:t>9/26/2018</a:t>
             </a:fld>
             <a:endParaRPr lang="en-US" dirty="0"/>
           </a:p>
@@ -3140,7 +3140,7 @@
             <a:fld id="{7DDB771E-4AED-4DD3-8AA1-5D9FD2224F14}" type="datetimeFigureOut">
               <a:rPr lang="en-US" smtClean="0"/>
               <a:pPr/>
-              <a:t>9/18/2018</a:t>
+              <a:t>9/26/2018</a:t>
             </a:fld>
             <a:endParaRPr lang="en-US" dirty="0"/>
           </a:p>
@@ -3390,7 +3390,7 @@
             <a:fld id="{7DDB771E-4AED-4DD3-8AA1-5D9FD2224F14}" type="datetimeFigureOut">
               <a:rPr lang="en-US" smtClean="0"/>
               <a:pPr/>
-              <a:t>9/18/2018</a:t>
+              <a:t>9/26/2018</a:t>
             </a:fld>
             <a:endParaRPr lang="en-US" dirty="0"/>
           </a:p>
@@ -3600,7 +3600,7 @@
             <a:fld id="{7DDB771E-4AED-4DD3-8AA1-5D9FD2224F14}" type="datetimeFigureOut">
               <a:rPr lang="en-US" smtClean="0"/>
               <a:pPr/>
-              <a:t>9/18/2018</a:t>
+              <a:t>9/26/2018</a:t>
             </a:fld>
             <a:endParaRPr lang="en-US" dirty="0"/>
           </a:p>
@@ -3685,6 +3685,66 @@
           </a:p>
         </p:txBody>
       </p:sp>
+      <p:pic>
+        <p:nvPicPr>
+          <p:cNvPr id="7" name="Picture 6"/>
+          <p:cNvPicPr>
+            <a:picLocks noChangeAspect="1"/>
+          </p:cNvPicPr>
+          <p:nvPr userDrawn="1"/>
+        </p:nvPicPr>
+        <p:blipFill>
+          <a:blip r:embed="rId13">
+            <a:extLst>
+              <a:ext uri="{28A0092B-C50C-407E-A947-70E740481C1C}">
+                <a14:useLocalDpi xmlns:a14="http://schemas.microsoft.com/office/drawing/2010/main" val="0"/>
+              </a:ext>
+            </a:extLst>
+          </a:blip>
+          <a:stretch>
+            <a:fillRect/>
+          </a:stretch>
+        </p:blipFill>
+        <p:spPr>
+          <a:xfrm>
+            <a:off x="7845588" y="210960"/>
+            <a:ext cx="1143160" cy="762106"/>
+          </a:xfrm>
+          <a:prstGeom prst="rect">
+            <a:avLst/>
+          </a:prstGeom>
+        </p:spPr>
+      </p:pic>
+      <p:pic>
+        <p:nvPicPr>
+          <p:cNvPr id="8" name="Picture 7"/>
+          <p:cNvPicPr>
+            <a:picLocks noChangeAspect="1"/>
+          </p:cNvPicPr>
+          <p:nvPr userDrawn="1"/>
+        </p:nvPicPr>
+        <p:blipFill>
+          <a:blip r:embed="rId14">
+            <a:extLst>
+              <a:ext uri="{28A0092B-C50C-407E-A947-70E740481C1C}">
+                <a14:useLocalDpi xmlns:a14="http://schemas.microsoft.com/office/drawing/2010/main" val="0"/>
+              </a:ext>
+            </a:extLst>
+          </a:blip>
+          <a:stretch>
+            <a:fillRect/>
+          </a:stretch>
+        </p:blipFill>
+        <p:spPr>
+          <a:xfrm>
+            <a:off x="228728" y="251407"/>
+            <a:ext cx="1371600" cy="1009650"/>
+          </a:xfrm>
+          <a:prstGeom prst="rect">
+            <a:avLst/>
+          </a:prstGeom>
+        </p:spPr>
+      </p:pic>
     </p:spTree>
   </p:cSld>
   <p:clrMap bg1="lt1" tx1="dk1" bg2="lt2" tx2="dk2" accent1="accent1" accent2="accent2" accent3="accent3" accent4="accent4" accent5="accent5" accent6="accent6" hlink="hlink" folHlink="folHlink"/>
@@ -3979,7 +4039,7 @@
         </p:nvSpPr>
         <p:spPr>
           <a:xfrm>
-            <a:off x="3117273" y="4261150"/>
+            <a:off x="2875733" y="2777407"/>
             <a:ext cx="2951754" cy="646331"/>
           </a:xfrm>
           <a:prstGeom prst="rect">
@@ -4189,7 +4249,7 @@
           <a:p>
             <a:r>
               <a:rPr lang="en-US" dirty="0" smtClean="0"/>
-              <a:t>My AWS EKS QuickStart</a:t>
+              <a:t>AWS EKS QuickStart</a:t>
             </a:r>
           </a:p>
           <a:p>
@@ -4629,7 +4689,7 @@
             </a:r>
             <a:r>
               <a:rPr lang="en-US" dirty="0" smtClean="0"/>
-              <a:t>open-source Kubernetes software</a:t>
+              <a:t>open-source Kubernetes software. Currently 1.10.3</a:t>
             </a:r>
           </a:p>
           <a:p>
@@ -4818,7 +4878,7 @@
             </a:r>
             <a:r>
               <a:rPr lang="en-US" dirty="0" smtClean="0"/>
-              <a:t>and awscli version 1.15.x or greater</a:t>
+              <a:t>and aws cli version 1.15.x or greater</a:t>
             </a:r>
           </a:p>
           <a:p>
@@ -4972,7 +5032,7 @@
         </p:blipFill>
         <p:spPr bwMode="auto">
           <a:xfrm>
-            <a:off x="291313" y="1569855"/>
+            <a:off x="291313" y="1561229"/>
             <a:ext cx="8569466" cy="5138442"/>
           </a:xfrm>
           <a:prstGeom prst="rect">
@@ -5146,7 +5206,7 @@
       </p:sp>
       <p:pic>
         <p:nvPicPr>
-          <p:cNvPr id="2050" name="Picture 2"/>
+          <p:cNvPr id="4" name="Picture 2"/>
           <p:cNvPicPr>
             <a:picLocks noChangeAspect="1" noChangeArrowheads="1"/>
           </p:cNvPicPr>
@@ -5167,8 +5227,8 @@
         </p:blipFill>
         <p:spPr bwMode="auto">
           <a:xfrm>
-            <a:off x="274927" y="1344815"/>
-            <a:ext cx="8529006" cy="5286800"/>
+            <a:off x="326689" y="1561229"/>
+            <a:ext cx="8534090" cy="5157003"/>
           </a:xfrm>
           <a:prstGeom prst="rect">
             <a:avLst/>
@@ -5276,8 +5336,8 @@
         </p:nvSpPr>
         <p:spPr>
           <a:xfrm>
-            <a:off x="501706" y="1584186"/>
-            <a:ext cx="7986839" cy="2585323"/>
+            <a:off x="879894" y="1584186"/>
+            <a:ext cx="7608651" cy="2308324"/>
           </a:xfrm>
           <a:prstGeom prst="rect">
             <a:avLst/>
@@ -5314,15 +5374,15 @@
             </a:pPr>
             <a:r>
               <a:rPr lang="en-US" dirty="0" smtClean="0"/>
-              <a:t>  Add </a:t>
+              <a:t>  Create </a:t>
             </a:r>
             <a:r>
               <a:rPr lang="en-US" dirty="0"/>
-              <a:t>Amazon EC2 Full Access to Service </a:t>
-            </a:r>
-            <a:r>
-              <a:rPr lang="en-US" dirty="0" smtClean="0"/>
-              <a:t>Role (AWS IAM Console)</a:t>
+              <a:t>your Amazon EKS Cluster </a:t>
+            </a:r>
+            <a:r>
+              <a:rPr lang="en-US" dirty="0" smtClean="0"/>
+              <a:t>VPC (AWS CloudFormation)</a:t>
             </a:r>
           </a:p>
           <a:p>
@@ -5331,16 +5391,24 @@
               <a:buChar char="•"/>
             </a:pPr>
             <a:r>
-              <a:rPr lang="en-US" dirty="0" smtClean="0"/>
-              <a:t>  Create </a:t>
-            </a:r>
-            <a:r>
               <a:rPr lang="en-US" dirty="0"/>
-              <a:t>your Amazon EKS Cluster </a:t>
-            </a:r>
-            <a:r>
-              <a:rPr lang="en-US" dirty="0" smtClean="0"/>
-              <a:t>VPC (CloudFormation)</a:t>
+              <a:t> </a:t>
+            </a:r>
+            <a:r>
+              <a:rPr lang="en-US" dirty="0" smtClean="0"/>
+              <a:t> </a:t>
+            </a:r>
+            <a:r>
+              <a:rPr lang="en-US" b="1" dirty="0" smtClean="0"/>
+              <a:t>Create </a:t>
+            </a:r>
+            <a:r>
+              <a:rPr lang="en-US" b="1" dirty="0"/>
+              <a:t>your Amazon EKS </a:t>
+            </a:r>
+            <a:r>
+              <a:rPr lang="en-US" b="1" dirty="0" smtClean="0"/>
+              <a:t>Cluster (AWS EKS Console)</a:t>
             </a:r>
           </a:p>
           <a:p>
@@ -5349,24 +5417,16 @@
               <a:buChar char="•"/>
             </a:pPr>
             <a:r>
+              <a:rPr lang="en-US" dirty="0" smtClean="0"/>
+              <a:t>  Launch </a:t>
+            </a:r>
+            <a:r>
               <a:rPr lang="en-US" dirty="0"/>
-              <a:t> </a:t>
-            </a:r>
-            <a:r>
-              <a:rPr lang="en-US" dirty="0" smtClean="0"/>
-              <a:t> </a:t>
-            </a:r>
-            <a:r>
-              <a:rPr lang="en-US" b="1" dirty="0" smtClean="0"/>
-              <a:t>Create </a:t>
-            </a:r>
-            <a:r>
-              <a:rPr lang="en-US" b="1" dirty="0"/>
-              <a:t>your Amazon EKS </a:t>
-            </a:r>
-            <a:r>
-              <a:rPr lang="en-US" b="1" dirty="0" smtClean="0"/>
-              <a:t>Cluster (AWS EKS Console)</a:t>
+              <a:t>and Configure Your Amazon EKS Worker </a:t>
+            </a:r>
+            <a:r>
+              <a:rPr lang="en-US" dirty="0" smtClean="0"/>
+              <a:t>Nodes (AWS CloudFormation)</a:t>
             </a:r>
           </a:p>
           <a:p>
@@ -5376,15 +5436,7 @@
             </a:pPr>
             <a:r>
               <a:rPr lang="en-US" dirty="0" smtClean="0"/>
-              <a:t>  Launch </a:t>
-            </a:r>
-            <a:r>
-              <a:rPr lang="en-US" dirty="0"/>
-              <a:t>and Configure Your Amazon EKS Worker </a:t>
-            </a:r>
-            <a:r>
-              <a:rPr lang="en-US" dirty="0" smtClean="0"/>
-              <a:t>Nodes (AWS CloudFormation)</a:t>
+              <a:t>  Configure Your AWS EC2 Instance (AWS EC2 Console)</a:t>
             </a:r>
           </a:p>
           <a:p>
@@ -5394,7 +5446,7 @@
             </a:pPr>
             <a:r>
               <a:rPr lang="en-US" dirty="0" smtClean="0"/>
-              <a:t>  Configure Your AWS EC2 Instance (AWS EC2 Console cloud-init)</a:t>
+              <a:t>  Configure kubectl on Your EC2 Instance (AWS EC2 Instance)</a:t>
             </a:r>
           </a:p>
           <a:p>
@@ -5404,7 +5456,15 @@
             </a:pPr>
             <a:r>
               <a:rPr lang="en-US" dirty="0" smtClean="0"/>
-              <a:t>  Configure kubectl on Your EC2 Instance (AWS EC2 Instance kubectl)</a:t>
+              <a:t>  Enable </a:t>
+            </a:r>
+            <a:r>
+              <a:rPr lang="en-US" dirty="0"/>
+              <a:t>Worker Nodes to Join Your </a:t>
+            </a:r>
+            <a:r>
+              <a:rPr lang="en-US" dirty="0" smtClean="0"/>
+              <a:t>Cluster (AWS EC2 Instance)</a:t>
             </a:r>
           </a:p>
           <a:p>
@@ -5413,24 +5473,6 @@
               <a:buChar char="•"/>
             </a:pPr>
             <a:r>
-              <a:rPr lang="en-US" dirty="0" smtClean="0"/>
-              <a:t>  Enable </a:t>
-            </a:r>
-            <a:r>
-              <a:rPr lang="en-US" dirty="0"/>
-              <a:t>Worker Nodes to Join Your </a:t>
-            </a:r>
-            <a:r>
-              <a:rPr lang="en-US" dirty="0" smtClean="0"/>
-              <a:t>Cluster (AWS EC2 Instance kubectl)</a:t>
-            </a:r>
-          </a:p>
-          <a:p>
-            <a:pPr>
-              <a:buFont typeface="Arial" pitchFamily="34" charset="0"/>
-              <a:buChar char="•"/>
-            </a:pPr>
-            <a:r>
               <a:rPr lang="en-US" dirty="0"/>
               <a:t> </a:t>
             </a:r>
@@ -5444,7 +5486,7 @@
             </a:r>
             <a:r>
               <a:rPr lang="en-US" dirty="0" smtClean="0"/>
-              <a:t>Cluster (AWS EC2 Instance kubectl)</a:t>
+              <a:t>Cluster (AWS EC2 Instance)</a:t>
             </a:r>
           </a:p>
         </p:txBody>
@@ -5513,7 +5555,7 @@
         <p:spPr>
           <a:xfrm>
             <a:off x="757367" y="1584186"/>
-            <a:ext cx="7515090" cy="3139321"/>
+            <a:ext cx="7515090" cy="2862322"/>
           </a:xfrm>
           <a:prstGeom prst="rect">
             <a:avLst/>
@@ -5532,7 +5574,60 @@
             </a:pPr>
             <a:r>
               <a:rPr lang="en-US" dirty="0" smtClean="0"/>
-              <a:t>  To save time AWS EKS Cluster has already been configured using the AWS Web Console, CloudFormation, cloud-init script, and some manual configuration.</a:t>
+              <a:t>  To save time AWS EKS Cluster has already been configured using the AWS Web Console, CloudFormation scripts, a cloud-init script, and some manual configuration. </a:t>
+            </a:r>
+            <a:r>
+              <a:rPr lang="en-US" dirty="0"/>
+              <a:t> </a:t>
+            </a:r>
+            <a:r>
+              <a:rPr lang="en-US" dirty="0" smtClean="0"/>
+              <a:t> I’ve already:</a:t>
+            </a:r>
+          </a:p>
+          <a:p>
+            <a:pPr lvl="1">
+              <a:buFont typeface="Arial" pitchFamily="34" charset="0"/>
+              <a:buChar char="•"/>
+            </a:pPr>
+            <a:r>
+              <a:rPr lang="en-US" dirty="0"/>
+              <a:t> </a:t>
+            </a:r>
+            <a:r>
+              <a:rPr lang="en-US" dirty="0" smtClean="0"/>
+              <a:t> Created a docker image located in DockerHub at kskalvar/web. This image is nothing more than a simple flask webapp that returns the current ip address of the container it's running in.</a:t>
+            </a:r>
+          </a:p>
+          <a:p>
+            <a:pPr lvl="1">
+              <a:buFont typeface="Arial" pitchFamily="34" charset="0"/>
+              <a:buChar char="•"/>
+            </a:pPr>
+            <a:r>
+              <a:rPr lang="en-US" dirty="0" smtClean="0"/>
+              <a:t>  Created a pod</a:t>
+            </a:r>
+          </a:p>
+          <a:p>
+            <a:pPr lvl="1">
+              <a:buFont typeface="Arial" pitchFamily="34" charset="0"/>
+              <a:buChar char="•"/>
+            </a:pPr>
+            <a:r>
+              <a:rPr lang="en-US" dirty="0" smtClean="0"/>
+              <a:t>  Scaled the pod</a:t>
+            </a:r>
+            <a:endParaRPr lang="en-US" dirty="0"/>
+          </a:p>
+          <a:p>
+            <a:pPr lvl="1">
+              <a:buFont typeface="Arial" pitchFamily="34" charset="0"/>
+              <a:buChar char="•"/>
+            </a:pPr>
+            <a:r>
+              <a:rPr lang="en-US" dirty="0" smtClean="0"/>
+              <a:t>  Created an external AWS Load Balancer</a:t>
             </a:r>
           </a:p>
           <a:p>
@@ -5541,32 +5636,12 @@
               <a:buChar char="•"/>
             </a:pPr>
             <a:r>
-              <a:rPr lang="en-US" dirty="0" smtClean="0"/>
-              <a:t>  We’ll:</a:t>
-            </a:r>
-          </a:p>
-          <a:p>
-            <a:pPr lvl="1">
-              <a:buFont typeface="Arial" pitchFamily="34" charset="0"/>
-              <a:buChar char="•"/>
-            </a:pPr>
-            <a:r>
-              <a:rPr lang="en-US" dirty="0" smtClean="0"/>
-              <a:t>  Deploy an application using a docker image located in DockerHub at kskalvar/web. This image is nothing more than a simple flask webapp that returns the current ip address of the container it's running in. We'll create a pod, scale the pod, and create an external AWS Load Balancer using kubectl.</a:t>
-            </a:r>
-          </a:p>
-          <a:p>
-            <a:pPr lvl="1">
-              <a:buFont typeface="Arial" pitchFamily="34" charset="0"/>
-              <a:buChar char="•"/>
-            </a:pPr>
-            <a:r>
               <a:rPr lang="en-US" dirty="0"/>
               <a:t> </a:t>
             </a:r>
             <a:r>
               <a:rPr lang="en-US" dirty="0" smtClean="0"/>
-              <a:t> Once the running the external load balancer is configured you should see a unique ip address as it is load balanced across containers.</a:t>
+              <a:t> You should see a unique ip address as it is load balanced across containers.</a:t>
             </a:r>
           </a:p>
         </p:txBody>
@@ -5640,7 +5715,7 @@
         <p:spPr>
           <a:xfrm>
             <a:off x="757367" y="1584186"/>
-            <a:ext cx="7515090" cy="2308324"/>
+            <a:ext cx="7515090" cy="2031325"/>
           </a:xfrm>
           <a:prstGeom prst="rect">
             <a:avLst/>
@@ -5695,24 +5770,6 @@
             </a:r>
             <a:r>
               <a:rPr lang="en-US" dirty="0" smtClean="0"/>
-              <a:t> AWS EKS Fargate still a ways </a:t>
-            </a:r>
-            <a:r>
-              <a:rPr lang="en-US" dirty="0" smtClean="0"/>
-              <a:t>off</a:t>
-            </a:r>
-          </a:p>
-          <a:p>
-            <a:pPr lvl="1">
-              <a:buFont typeface="Arial" pitchFamily="34" charset="0"/>
-              <a:buChar char="•"/>
-            </a:pPr>
-            <a:r>
-              <a:rPr lang="en-US" dirty="0"/>
-              <a:t> </a:t>
-            </a:r>
-            <a:r>
-              <a:rPr lang="en-US" dirty="0" smtClean="0"/>
               <a:t> </a:t>
             </a:r>
             <a:r>
@@ -5723,7 +5780,6 @@
               <a:rPr lang="en-US" dirty="0" smtClean="0"/>
               <a:t>2018</a:t>
             </a:r>
-            <a:endParaRPr lang="en-US" dirty="0" smtClean="0"/>
           </a:p>
           <a:p>
             <a:pPr>

</xml_diff>